<commit_message>
Update poster and Adam_Version_Clement_Modified
</commit_message>
<xml_diff>
--- a/poster.pptx
+++ b/poster.pptx
@@ -278,7 +278,7 @@
             <a:fld id="{EDAC6055-BED3-441F-92AC-38E57413D38A}" type="datetime1">
               <a:rPr lang="en-US" altLang="en-US"/>
               <a:pPr/>
-              <a:t>8/10/20</a:t>
+              <a:t>8/10/2020</a:t>
             </a:fld>
             <a:endParaRPr lang="en-US" altLang="en-US"/>
           </a:p>
@@ -470,7 +470,7 @@
             <a:fld id="{24751E58-F098-4B7F-81BC-F51406B70D95}" type="datetime1">
               <a:rPr lang="en-US" altLang="en-US"/>
               <a:pPr/>
-              <a:t>8/10/20</a:t>
+              <a:t>8/10/2020</a:t>
             </a:fld>
             <a:endParaRPr lang="en-US" altLang="en-US"/>
           </a:p>
@@ -1051,7 +1051,7 @@
             <a:fld id="{645BB259-A352-4EB3-8ABF-134E29B1E5F0}" type="datetime1">
               <a:rPr lang="en-US" altLang="en-US"/>
               <a:pPr/>
-              <a:t>8/10/20</a:t>
+              <a:t>8/10/2020</a:t>
             </a:fld>
             <a:endParaRPr lang="en-US" altLang="en-US"/>
           </a:p>
@@ -1236,7 +1236,7 @@
             <a:fld id="{78E00C68-3E00-4B4A-BA1B-53F232C24194}" type="datetime1">
               <a:rPr lang="en-US" altLang="en-US"/>
               <a:pPr/>
-              <a:t>8/10/20</a:t>
+              <a:t>8/10/2020</a:t>
             </a:fld>
             <a:endParaRPr lang="en-US" altLang="en-US"/>
           </a:p>
@@ -1431,7 +1431,7 @@
             <a:fld id="{121D94DF-45C0-4A2C-AB74-4DB596A15330}" type="datetime1">
               <a:rPr lang="en-US" altLang="en-US"/>
               <a:pPr/>
-              <a:t>8/10/20</a:t>
+              <a:t>8/10/2020</a:t>
             </a:fld>
             <a:endParaRPr lang="en-US" altLang="en-US"/>
           </a:p>
@@ -1616,7 +1616,7 @@
             <a:fld id="{088C3835-CEE0-4505-9665-5573C790ED16}" type="datetime1">
               <a:rPr lang="en-US" altLang="en-US"/>
               <a:pPr/>
-              <a:t>8/10/20</a:t>
+              <a:t>8/10/2020</a:t>
             </a:fld>
             <a:endParaRPr lang="en-US" altLang="en-US"/>
           </a:p>
@@ -1878,7 +1878,7 @@
             <a:fld id="{D5EC548E-AB30-45E3-9EFD-4ABD517D5FFB}" type="datetime1">
               <a:rPr lang="en-US" altLang="en-US"/>
               <a:pPr/>
-              <a:t>8/10/20</a:t>
+              <a:t>8/10/2020</a:t>
             </a:fld>
             <a:endParaRPr lang="en-US" altLang="en-US"/>
           </a:p>
@@ -2180,7 +2180,7 @@
             <a:fld id="{9C9EA653-160A-48A7-96FE-D81DDD2A6265}" type="datetime1">
               <a:rPr lang="en-US" altLang="en-US"/>
               <a:pPr/>
-              <a:t>8/10/20</a:t>
+              <a:t>8/10/2020</a:t>
             </a:fld>
             <a:endParaRPr lang="en-US" altLang="en-US"/>
           </a:p>
@@ -2616,7 +2616,7 @@
             <a:fld id="{2F9FB84D-DD03-420E-8CB9-41B71FB842D0}" type="datetime1">
               <a:rPr lang="en-US" altLang="en-US"/>
               <a:pPr/>
-              <a:t>8/10/20</a:t>
+              <a:t>8/10/2020</a:t>
             </a:fld>
             <a:endParaRPr lang="en-US" altLang="en-US"/>
           </a:p>
@@ -2750,7 +2750,7 @@
             <a:fld id="{C7B1E4B5-FC98-4F60-98B5-0E1785FC4AC2}" type="datetime1">
               <a:rPr lang="en-US" altLang="en-US"/>
               <a:pPr/>
-              <a:t>8/10/20</a:t>
+              <a:t>8/10/2020</a:t>
             </a:fld>
             <a:endParaRPr lang="en-US" altLang="en-US"/>
           </a:p>
@@ -2862,7 +2862,7 @@
             <a:fld id="{31B70B8E-EA66-4125-B228-E7659303DF53}" type="datetime1">
               <a:rPr lang="en-US" altLang="en-US"/>
               <a:pPr/>
-              <a:t>8/10/20</a:t>
+              <a:t>8/10/2020</a:t>
             </a:fld>
             <a:endParaRPr lang="en-US" altLang="en-US"/>
           </a:p>
@@ -3154,7 +3154,7 @@
             <a:fld id="{F6E4866A-E706-4541-8880-33314C2B233F}" type="datetime1">
               <a:rPr lang="en-US" altLang="en-US"/>
               <a:pPr/>
-              <a:t>8/10/20</a:t>
+              <a:t>8/10/2020</a:t>
             </a:fld>
             <a:endParaRPr lang="en-US" altLang="en-US"/>
           </a:p>
@@ -3426,7 +3426,7 @@
             <a:fld id="{DB3EE76A-02DB-42FA-91C2-3E760E39DD17}" type="datetime1">
               <a:rPr lang="en-US" altLang="en-US"/>
               <a:pPr/>
-              <a:t>8/10/20</a:t>
+              <a:t>8/10/2020</a:t>
             </a:fld>
             <a:endParaRPr lang="en-US" altLang="en-US"/>
           </a:p>
@@ -3706,7 +3706,7 @@
             <a:fld id="{FEA6808C-36B9-4536-83CF-D3C352952614}" type="datetime1">
               <a:rPr lang="en-US" altLang="en-US"/>
               <a:pPr/>
-              <a:t>8/10/20</a:t>
+              <a:t>8/10/2020</a:t>
             </a:fld>
             <a:endParaRPr lang="en-US" altLang="en-US"/>
           </a:p>
@@ -4232,7 +4232,7 @@
         </p:nvGrpSpPr>
         <p:grpSpPr bwMode="auto">
           <a:xfrm>
-            <a:off x="-10886" y="0"/>
+            <a:off x="-10886" y="-76200"/>
             <a:ext cx="31089600" cy="43891200"/>
             <a:chOff x="0" y="0"/>
             <a:chExt cx="31089600" cy="43891200"/>
@@ -4540,7 +4540,7 @@
                 <a:ea typeface="ＭＳ Ｐゴシック" panose="020B0600070205080204" pitchFamily="34" charset="-128"/>
                 <a:cs typeface="Arial" panose="020B0604020202020204" pitchFamily="34" charset="0"/>
               </a:rPr>
-              <a:t>The results for the 1-day prediction results  in an accuracy anywhere from 51% to 59%, as well as also getting an AUC score of 0.6. The ROC curve that is created also matches what a good predictive classifier's ROC curves graph should look like.</a:t>
+              <a:t>The results for the 1-day prediction results  in an accuracy anywhere from 51% to 52%, as well as also getting an AUC score of 0.6. The ROC curve that is created also matches what a good predictive classifier's ROC curves graph should look like.</a:t>
             </a:r>
           </a:p>
           <a:p>
@@ -4550,7 +4550,7 @@
                 <a:ea typeface="ＭＳ Ｐゴシック" panose="020B0600070205080204" pitchFamily="34" charset="-128"/>
                 <a:cs typeface="Arial" panose="020B0604020202020204" pitchFamily="34" charset="0"/>
               </a:rPr>
-              <a:t>The results for the 7-day prediction results  in an accuracy anywhere from 70% to 77%, getting an AUC score of 0.86. </a:t>
+              <a:t>The results for the 7-day prediction results  in an accuracy anywhere from 55% to 57%, getting an AUC score of 0.55. </a:t>
             </a:r>
           </a:p>
           <a:p>
@@ -4560,7 +4560,7 @@
                 <a:ea typeface="ＭＳ Ｐゴシック" panose="020B0600070205080204" pitchFamily="34" charset="-128"/>
                 <a:cs typeface="Arial" panose="020B0604020202020204" pitchFamily="34" charset="0"/>
               </a:rPr>
-              <a:t>The results for the 30-day prediction results  in an accuracy anywhere from 88% to 91%, getting an AUC score of 0.97. </a:t>
+              <a:t>The results for the 30-day prediction results  in an accuracy anywhere from 67% to 70%, getting an AUC score of 0.74. </a:t>
             </a:r>
           </a:p>
           <a:p>
@@ -4570,7 +4570,7 @@
                 <a:ea typeface="ＭＳ Ｐゴシック" panose="020B0600070205080204" pitchFamily="34" charset="-128"/>
                 <a:cs typeface="Arial" panose="020B0604020202020204" pitchFamily="34" charset="0"/>
               </a:rPr>
-              <a:t>The results for the 60-day prediction results  in an accuracy anywhere from 89% to 93%, getting an AUC score of 0.98. </a:t>
+              <a:t>The results for the 60-day prediction results  in an accuracy anywhere from 62% to 65%, getting an AUC score of 0.76. </a:t>
             </a:r>
           </a:p>
           <a:p>
@@ -4831,7 +4831,7 @@
         </p:nvSpPr>
         <p:spPr bwMode="auto">
           <a:xfrm>
-            <a:off x="1158628" y="28871862"/>
+            <a:off x="1252290" y="28643262"/>
             <a:ext cx="14292510" cy="13419138"/>
           </a:xfrm>
           <a:prstGeom prst="rect">
@@ -4993,7 +4993,21 @@
                 <a:latin typeface="+mn-lt"/>
                 <a:cs typeface="Arial" panose="020B0604020202020204" pitchFamily="34" charset="0"/>
               </a:rPr>
-              <a:t>We collect and separate our target variables from the rest of the data, and create train and test sets.</a:t>
+              <a:t>We collect and separate our target variables from the rest of the data, and create train and test </a:t>
+            </a:r>
+            <a:r>
+              <a:rPr lang="en-US" altLang="en-US" sz="3600" dirty="0" err="1">
+                <a:latin typeface="+mn-lt"/>
+                <a:cs typeface="Arial" panose="020B0604020202020204" pitchFamily="34" charset="0"/>
+              </a:rPr>
+              <a:t>sets.We</a:t>
+            </a:r>
+            <a:r>
+              <a:rPr lang="en-US" altLang="en-US" sz="3600" dirty="0">
+                <a:latin typeface="+mn-lt"/>
+                <a:cs typeface="Arial" panose="020B0604020202020204" pitchFamily="34" charset="0"/>
+              </a:rPr>
+              <a:t> train on data from September of 2012 to August of 2018, and we test on data from August of 2018 to July of 2020.</a:t>
             </a:r>
           </a:p>
           <a:p>
@@ -5069,7 +5083,7 @@
                 <a:latin typeface="+mn-lt"/>
                 <a:cs typeface="Arial" panose="020B0604020202020204" pitchFamily="34" charset="0"/>
               </a:rPr>
-              <a:t>’ were used as models for predicting the CDX.IG and the CDX.HY. Random Forest was used since it less likely to be influenced by outliers, and can also handle non-linear relationships.</a:t>
+              <a:t>’ was tested, since the Random Forest algorithm is less likely to be influenced by outliers, and can also handle non-linear relationships.</a:t>
             </a:r>
           </a:p>
           <a:p>
@@ -5082,13 +5096,6 @@
               </a:spcAft>
             </a:pPr>
             <a:r>
-              <a:rPr lang="en-US" altLang="en-US" sz="3600" dirty="0">
-                <a:latin typeface="+mn-lt"/>
-                <a:cs typeface="Arial" panose="020B0604020202020204" pitchFamily="34" charset="0"/>
-              </a:rPr>
-              <a:t>Other models test were </a:t>
-            </a:r>
-            <a:r>
               <a:rPr lang="en-US" altLang="en-US" sz="3600" dirty="0" err="1">
                 <a:latin typeface="+mn-lt"/>
                 <a:cs typeface="Arial" panose="020B0604020202020204" pitchFamily="34" charset="0"/>
@@ -5100,7 +5107,7 @@
                 <a:latin typeface="+mn-lt"/>
                 <a:cs typeface="Arial" panose="020B0604020202020204" pitchFamily="34" charset="0"/>
               </a:rPr>
-              <a:t>, with parameters using </a:t>
+              <a:t> was picked as the final ML algorithm to reduce both bias and variance in the data, where Random Forest only reduced variance. We used the parameters of </a:t>
             </a:r>
             <a:r>
               <a:rPr lang="en-US" altLang="en-US" sz="3600" dirty="0" err="1">
@@ -5114,35 +5121,22 @@
                 <a:latin typeface="+mn-lt"/>
                 <a:cs typeface="Arial" panose="020B0604020202020204" pitchFamily="34" charset="0"/>
               </a:rPr>
-              <a:t> equal to 50 and learning rate equal to 1.</a:t>
-            </a:r>
-          </a:p>
-          <a:p>
-            <a:pPr marL="0" indent="0" eaLnBrk="1" hangingPunct="1">
-              <a:spcBef>
-                <a:spcPts val="600"/>
-              </a:spcBef>
-              <a:spcAft>
-                <a:spcPts val="600"/>
-              </a:spcAft>
-            </a:pPr>
+              <a:t> equal to 30 and learning rate equal to 0.5</a:t>
+            </a:r>
+            <a:r>
+              <a:rPr lang="en-US" altLang="en-US" sz="3600">
+                <a:latin typeface="+mn-lt"/>
+                <a:cs typeface="Arial" panose="020B0604020202020204" pitchFamily="34" charset="0"/>
+              </a:rPr>
+              <a:t>, parameters </a:t>
+            </a:r>
             <a:r>
               <a:rPr lang="en-US" altLang="en-US" sz="3600" dirty="0">
                 <a:latin typeface="+mn-lt"/>
                 <a:cs typeface="Arial" panose="020B0604020202020204" pitchFamily="34" charset="0"/>
               </a:rPr>
-              <a:t>The prediction created by these models are binary outputs predicting if we predict and increase in price or a decrease. A simpler binary prediction was chosen over regression to try to increase prediction accuracy</a:t>
-            </a:r>
-          </a:p>
-          <a:p>
-            <a:pPr eaLnBrk="1" hangingPunct="1">
-              <a:buFont typeface="Arial" panose="020B0604020202020204" pitchFamily="34" charset="0"/>
-              <a:buNone/>
-            </a:pPr>
-            <a:endParaRPr lang="en-US" altLang="en-US" sz="3600" dirty="0">
-              <a:latin typeface="+mn-lt"/>
-              <a:cs typeface="Arial" panose="020B0604020202020204" pitchFamily="34" charset="0"/>
-            </a:endParaRPr>
+              <a:t>which were acquired using cross validation. The prediction created by these models are binary outputs predicting if we predict and increase in price or a decrease. A simpler binary prediction was chosen over regression to try to increase prediction accuracy.</a:t>
+            </a:r>
           </a:p>
         </p:txBody>
       </p:sp>
@@ -5548,7 +5542,7 @@
         </p:nvSpPr>
         <p:spPr bwMode="auto">
           <a:xfrm>
-            <a:off x="1219200" y="15054716"/>
+            <a:off x="1219200" y="14935200"/>
             <a:ext cx="14231938" cy="7195684"/>
           </a:xfrm>
           <a:prstGeom prst="rect">
@@ -5801,7 +5795,7 @@
         </p:nvSpPr>
         <p:spPr bwMode="auto">
           <a:xfrm>
-            <a:off x="1219201" y="22555200"/>
+            <a:off x="1219201" y="22410738"/>
             <a:ext cx="14231938" cy="6011862"/>
           </a:xfrm>
           <a:prstGeom prst="rect">

</xml_diff>

<commit_message>
Uploading the latest files
</commit_message>
<xml_diff>
--- a/poster.pptx
+++ b/poster.pptx
@@ -173,14 +173,6 @@
 </p:presentation>
 </file>
 
-<file path=ppt/revisionInfo.xml><?xml version="1.0" encoding="utf-8"?>
-<p1510:revInfo xmlns:a="http://schemas.openxmlformats.org/drawingml/2006/main" xmlns:r="http://schemas.openxmlformats.org/officeDocument/2006/relationships" xmlns:p1510="http://schemas.microsoft.com/office/powerpoint/2015/10/main">
-  <p1510:revLst>
-    <p1510:client id="{F160AD2E-A96A-4720-8A40-A8FE11D810C5}" v="741" dt="2020-08-06T19:52:01.011"/>
-  </p1510:revLst>
-</p1510:revInfo>
-</file>
-
 <file path=ppt/handoutMasters/handoutMaster1.xml><?xml version="1.0" encoding="utf-8"?>
 <p:handoutMaster xmlns:a="http://schemas.openxmlformats.org/drawingml/2006/main" xmlns:r="http://schemas.openxmlformats.org/officeDocument/2006/relationships" xmlns:p="http://schemas.openxmlformats.org/presentationml/2006/main">
   <p:cSld>
@@ -780,6 +772,91 @@
     </a:lvl9pPr>
   </p:notesStyle>
 </p:notesMaster>
+</file>
+
+<file path=ppt/notesSlides/notesSlide1.xml><?xml version="1.0" encoding="utf-8"?>
+<p:notes xmlns:a="http://schemas.openxmlformats.org/drawingml/2006/main" xmlns:r="http://schemas.openxmlformats.org/officeDocument/2006/relationships" xmlns:p="http://schemas.openxmlformats.org/presentationml/2006/main">
+  <p:cSld>
+    <p:spTree>
+      <p:nvGrpSpPr>
+        <p:cNvPr id="1" name=""/>
+        <p:cNvGrpSpPr/>
+        <p:nvPr/>
+      </p:nvGrpSpPr>
+      <p:grpSpPr>
+        <a:xfrm>
+          <a:off x="0" y="0"/>
+          <a:ext cx="0" cy="0"/>
+          <a:chOff x="0" y="0"/>
+          <a:chExt cx="0" cy="0"/>
+        </a:xfrm>
+      </p:grpSpPr>
+      <p:sp>
+        <p:nvSpPr>
+          <p:cNvPr id="2" name="Slide Image Placeholder 1"/>
+          <p:cNvSpPr>
+            <a:spLocks noGrp="1" noRot="1" noChangeAspect="1"/>
+          </p:cNvSpPr>
+          <p:nvPr>
+            <p:ph type="sldImg"/>
+          </p:nvPr>
+        </p:nvSpPr>
+        <p:spPr/>
+      </p:sp>
+      <p:sp>
+        <p:nvSpPr>
+          <p:cNvPr id="3" name="Notes Placeholder 2"/>
+          <p:cNvSpPr>
+            <a:spLocks noGrp="1"/>
+          </p:cNvSpPr>
+          <p:nvPr>
+            <p:ph type="body" idx="1"/>
+          </p:nvPr>
+        </p:nvSpPr>
+        <p:spPr/>
+        <p:txBody>
+          <a:bodyPr/>
+          <a:lstStyle/>
+          <a:p>
+            <a:endParaRPr lang="en-US" dirty="0"/>
+          </a:p>
+        </p:txBody>
+      </p:sp>
+      <p:sp>
+        <p:nvSpPr>
+          <p:cNvPr id="4" name="Slide Number Placeholder 3"/>
+          <p:cNvSpPr>
+            <a:spLocks noGrp="1"/>
+          </p:cNvSpPr>
+          <p:nvPr>
+            <p:ph type="sldNum" sz="quarter" idx="5"/>
+          </p:nvPr>
+        </p:nvSpPr>
+        <p:spPr/>
+        <p:txBody>
+          <a:bodyPr/>
+          <a:lstStyle/>
+          <a:p>
+            <a:fld id="{E2B0FF67-A9B4-4059-8354-4C13D880E8D6}" type="slidenum">
+              <a:rPr lang="en-US" altLang="en-US" smtClean="0"/>
+              <a:pPr/>
+              <a:t>1</a:t>
+            </a:fld>
+            <a:endParaRPr lang="en-US" altLang="en-US"/>
+          </a:p>
+        </p:txBody>
+      </p:sp>
+    </p:spTree>
+    <p:extLst>
+      <p:ext uri="{BB962C8B-B14F-4D97-AF65-F5344CB8AC3E}">
+        <p14:creationId xmlns:p14="http://schemas.microsoft.com/office/powerpoint/2010/main" val="1615583904"/>
+      </p:ext>
+    </p:extLst>
+  </p:cSld>
+  <p:clrMapOvr>
+    <a:masterClrMapping/>
+  </p:clrMapOvr>
+</p:notes>
 </file>
 
 <file path=ppt/slideLayouts/slideLayout1.xml><?xml version="1.0" encoding="utf-8"?>
@@ -4147,7 +4224,7 @@
         </p:nvGrpSpPr>
         <p:grpSpPr bwMode="auto">
           <a:xfrm>
-            <a:off x="-60326" y="-76200"/>
+            <a:off x="-10886" y="-76200"/>
             <a:ext cx="31089600" cy="43891200"/>
             <a:chOff x="0" y="0"/>
             <a:chExt cx="31089600" cy="43891200"/>
@@ -4334,7 +4411,7 @@
         </p:nvSpPr>
         <p:spPr>
           <a:xfrm>
-            <a:off x="5181600" y="777875"/>
+            <a:off x="4876800" y="879475"/>
             <a:ext cx="21869400" cy="3768725"/>
           </a:xfrm>
         </p:spPr>
@@ -4343,47 +4420,47 @@
           <a:lstStyle/>
           <a:p>
             <a:r>
-              <a:rPr lang="en-US" altLang="en-US" sz="11800" dirty="0">
+              <a:rPr lang="en-US" altLang="en-US" sz="9800" dirty="0">
                 <a:latin typeface="+mn-lt"/>
                 <a:ea typeface="ＭＳ Ｐゴシック"/>
               </a:rPr>
               <a:t>Trading Price Forecasting for the CDX  Market</a:t>
             </a:r>
             <a:br>
-              <a:rPr lang="en-US" altLang="en-US" sz="11900" dirty="0">
+              <a:rPr lang="en-US" altLang="en-US" sz="9900" dirty="0">
                 <a:latin typeface="+mn-lt"/>
                 <a:ea typeface="ＭＳ Ｐゴシック" panose="020B0600070205080204" pitchFamily="34" charset="-128"/>
               </a:rPr>
             </a:br>
             <a:r>
-              <a:rPr lang="en-US" altLang="en-US" sz="6000" dirty="0">
+              <a:rPr lang="en-US" altLang="en-US" sz="5400" dirty="0">
                 <a:latin typeface="+mn-lt"/>
                 <a:ea typeface="ＭＳ Ｐゴシック" panose="020B0600070205080204" pitchFamily="34" charset="-128"/>
               </a:rPr>
               <a:t>Adrian Adduci</a:t>
             </a:r>
             <a:r>
-              <a:rPr lang="en-US" altLang="en-US" sz="6000" dirty="0">
+              <a:rPr lang="en-US" altLang="en-US" sz="5400" dirty="0">
                 <a:latin typeface="+mn-lt"/>
                 <a:ea typeface="ＭＳ Ｐゴシック"/>
               </a:rPr>
               <a:t>, Clement Chin, Adam Kravitz, </a:t>
             </a:r>
             <a:r>
-              <a:rPr lang="en-US" altLang="en-US" sz="6000" dirty="0" err="1">
+              <a:rPr lang="en-US" altLang="en-US" sz="5400" dirty="0" err="1">
                 <a:latin typeface="+mn-lt"/>
                 <a:ea typeface="ＭＳ Ｐゴシック"/>
               </a:rPr>
               <a:t>Yuhao</a:t>
             </a:r>
             <a:r>
-              <a:rPr lang="en-US" altLang="en-US" sz="6000" dirty="0">
+              <a:rPr lang="en-US" altLang="en-US" sz="5400" dirty="0">
                 <a:latin typeface="+mn-lt"/>
                 <a:ea typeface="ＭＳ Ｐゴシック"/>
               </a:rPr>
               <a:t> Zhang</a:t>
             </a:r>
-            <a:endParaRPr lang="en-US" dirty="0">
+            <a:endParaRPr lang="en-US" sz="17200" dirty="0">
               <a:latin typeface="+mn-lt"/>
               <a:ea typeface="ＭＳ Ｐゴシック"/>
             </a:endParaRPr>
@@ -4402,8 +4479,8 @@
         </p:nvSpPr>
         <p:spPr>
           <a:xfrm>
-            <a:off x="16138525" y="5867401"/>
-            <a:ext cx="13731875" cy="15239999"/>
+            <a:off x="15952789" y="5867401"/>
+            <a:ext cx="13917611" cy="13411199"/>
           </a:xfrm>
           <a:ln>
             <a:solidFill>
@@ -4431,7 +4508,15 @@
             </a:r>
           </a:p>
           <a:p>
-            <a:pPr marL="738188" indent="-738188" eaLnBrk="1" hangingPunct="1"/>
+            <a:pPr marL="0" indent="0" eaLnBrk="1" hangingPunct="1">
+              <a:spcBef>
+                <a:spcPts val="600"/>
+              </a:spcBef>
+              <a:spcAft>
+                <a:spcPts val="600"/>
+              </a:spcAft>
+              <a:buNone/>
+            </a:pPr>
             <a:r>
               <a:rPr lang="en-US" altLang="en-US" sz="3600" dirty="0">
                 <a:ea typeface="ＭＳ Ｐゴシック" panose="020B0600070205080204" pitchFamily="34" charset="-128"/>
@@ -4441,47 +4526,55 @@
             </a:r>
           </a:p>
           <a:p>
-            <a:pPr marL="738188" indent="-738188" eaLnBrk="1" hangingPunct="1"/>
+            <a:pPr marL="457200" indent="-457200" eaLnBrk="1" hangingPunct="1"/>
             <a:r>
               <a:rPr lang="en-US" altLang="en-US" sz="3600" dirty="0">
                 <a:ea typeface="ＭＳ Ｐゴシック" panose="020B0600070205080204" pitchFamily="34" charset="-128"/>
                 <a:cs typeface="Arial" panose="020B0604020202020204" pitchFamily="34" charset="0"/>
               </a:rPr>
-              <a:t>The results for the 1-day prediction results  in an accuracy anywhere from 50% to 54%, as well as also getting an AUC score of 0.51. The ROC curve that is created also matches what a good predictive classifier's ROC curves graph should look like.</a:t>
-            </a:r>
-          </a:p>
-          <a:p>
-            <a:pPr marL="738188" indent="-738188" eaLnBrk="1" hangingPunct="1"/>
+              <a:t>The results for the 1-day prediction results  in an accuracy anywhere from 51% to 52%, as well as also getting an AUC score of 0.6. The ROC curve that is created also matches what a good predictive classifier's ROC curves graph should look like.</a:t>
+            </a:r>
+          </a:p>
+          <a:p>
+            <a:pPr marL="457200" indent="-457200" eaLnBrk="1" hangingPunct="1"/>
             <a:r>
               <a:rPr lang="en-US" altLang="en-US" sz="3600" dirty="0">
                 <a:ea typeface="ＭＳ Ｐゴシック" panose="020B0600070205080204" pitchFamily="34" charset="-128"/>
                 <a:cs typeface="Arial" panose="020B0604020202020204" pitchFamily="34" charset="0"/>
               </a:rPr>
-              <a:t>The results for the 7-day prediction results  in an accuracy anywhere from 56% to 60%, as well as also getting an AUC score of 0.59. </a:t>
-            </a:r>
-          </a:p>
-          <a:p>
-            <a:pPr marL="738188" indent="-738188" eaLnBrk="1" hangingPunct="1"/>
+              <a:t>The results for the 7-day prediction results  in an accuracy anywhere from 55% to 57%, getting an AUC score of 0.55. </a:t>
+            </a:r>
+          </a:p>
+          <a:p>
+            <a:pPr marL="457200" indent="-457200" eaLnBrk="1" hangingPunct="1"/>
             <a:r>
               <a:rPr lang="en-US" altLang="en-US" sz="3600" dirty="0">
                 <a:ea typeface="ＭＳ Ｐゴシック" panose="020B0600070205080204" pitchFamily="34" charset="-128"/>
                 <a:cs typeface="Arial" panose="020B0604020202020204" pitchFamily="34" charset="0"/>
               </a:rPr>
-              <a:t>The results for the 30-day prediction results  in an accuracy anywhere from 59% to 63%, as well as also getting an AUC score of 0.79. </a:t>
-            </a:r>
-          </a:p>
-          <a:p>
-            <a:pPr marL="738188" indent="-738188" eaLnBrk="1" hangingPunct="1"/>
+              <a:t>The results for the 30-day prediction results  in an accuracy anywhere from 67% to 70%, getting an AUC score of 0.74. </a:t>
+            </a:r>
+          </a:p>
+          <a:p>
+            <a:pPr marL="457200" indent="-457200" eaLnBrk="1" hangingPunct="1"/>
             <a:r>
               <a:rPr lang="en-US" altLang="en-US" sz="3600" dirty="0">
                 <a:ea typeface="ＭＳ Ｐゴシック" panose="020B0600070205080204" pitchFamily="34" charset="-128"/>
                 <a:cs typeface="Arial" panose="020B0604020202020204" pitchFamily="34" charset="0"/>
               </a:rPr>
-              <a:t>The results for the 60-day prediction results  in an accuracy anywhere from 63% to 67%, as well as also getting an AUC score of 0.85. </a:t>
-            </a:r>
-          </a:p>
-          <a:p>
-            <a:pPr marL="738188" indent="-738188" eaLnBrk="1" hangingPunct="1"/>
+              <a:t>The results for the 60-day prediction results  in an accuracy anywhere from 62% to 65%, getting an AUC score of 0.76. </a:t>
+            </a:r>
+          </a:p>
+          <a:p>
+            <a:pPr marL="0" indent="0" eaLnBrk="1" hangingPunct="1">
+              <a:spcBef>
+                <a:spcPts val="1200"/>
+              </a:spcBef>
+              <a:spcAft>
+                <a:spcPts val="600"/>
+              </a:spcAft>
+              <a:buNone/>
+            </a:pPr>
             <a:r>
               <a:rPr lang="en-US" altLang="en-US" sz="3600" dirty="0">
                 <a:ea typeface="ＭＳ Ｐゴシック" panose="020B0600070205080204" pitchFamily="34" charset="-128"/>
@@ -4503,7 +4596,7 @@
         <p:spPr bwMode="auto">
           <a:xfrm>
             <a:off x="1219200" y="5848351"/>
-            <a:ext cx="14325600" cy="7791449"/>
+            <a:ext cx="14231938" cy="8817427"/>
           </a:xfrm>
           <a:prstGeom prst="rect">
             <a:avLst/>
@@ -4653,27 +4746,53 @@
           <a:p>
             <a:pPr marL="0" indent="0" eaLnBrk="1" hangingPunct="1">
               <a:spcBef>
-                <a:spcPct val="20000"/>
+                <a:spcPts val="600"/>
               </a:spcBef>
-              <a:tabLst>
-                <a:tab pos="677863" algn="l"/>
-              </a:tabLst>
+              <a:spcAft>
+                <a:spcPts val="600"/>
+              </a:spcAft>
             </a:pPr>
             <a:r>
               <a:rPr lang="en-US" altLang="en-US" sz="3600" dirty="0">
                 <a:latin typeface="+mn-lt"/>
-                <a:ea typeface="ＭＳ Ｐゴシック"/>
-                <a:cs typeface="Arial"/>
+                <a:cs typeface="Arial" panose="020B0604020202020204" pitchFamily="34" charset="0"/>
               </a:rPr>
-              <a:t>	For investment professionals focused on fixed income instruments within the U.S. corporate credit market, there is a dearth of machine learning applied strategies currently available for investment professionals. Many current forecasting models are provided by research analysts utilzing sproadic macroeconomic indicators to predict valuations for fixed income instruments.  This is partially a result of lagging technological infrastructure in the credit markets, lower relative trading volumes when compared to more liquid asset classes such as equities, and slower release of primary and secondary market trading information.  As such, we will look to emply ML techniques to forecast trading probabilities for 2 credit instruments.</a:t>
-            </a:r>
-            <a:endParaRPr lang="en-US" altLang="en-US" sz="3600" dirty="0">
-              <a:solidFill>
-                <a:srgbClr val="000000"/>
-              </a:solidFill>
-              <a:latin typeface="+mn-lt"/>
-              <a:cs typeface="Arial" panose="020B0604020202020204" pitchFamily="34" charset="0"/>
-            </a:endParaRPr>
+              <a:t>For investment professionals focused on fixed income instruments within the U.S. corporate credit market, there is a dearth of machine learning applied strategies currently available for investment professionals. </a:t>
+            </a:r>
+          </a:p>
+          <a:p>
+            <a:pPr marL="0" indent="0" eaLnBrk="1" hangingPunct="1">
+              <a:spcBef>
+                <a:spcPts val="600"/>
+              </a:spcBef>
+              <a:spcAft>
+                <a:spcPts val="600"/>
+              </a:spcAft>
+            </a:pPr>
+            <a:r>
+              <a:rPr lang="en-US" altLang="en-US" sz="3600" dirty="0">
+                <a:latin typeface="+mn-lt"/>
+                <a:cs typeface="Arial" panose="020B0604020202020204" pitchFamily="34" charset="0"/>
+              </a:rPr>
+              <a:t>Many current forecasting models are provided by research analysts utilzing sproadic macroeconomic indicators to predict valuations for fixed income instruments.  This is partially a result of lagging technological infrastructure in the credit markets, lower relative trading volumes when compared to more liquid asset classes such as equities, and slower release of primary and secondary market trading information.  </a:t>
+            </a:r>
+          </a:p>
+          <a:p>
+            <a:pPr marL="0" indent="0" eaLnBrk="1" hangingPunct="1">
+              <a:spcBef>
+                <a:spcPts val="600"/>
+              </a:spcBef>
+              <a:spcAft>
+                <a:spcPts val="600"/>
+              </a:spcAft>
+            </a:pPr>
+            <a:r>
+              <a:rPr lang="en-US" altLang="en-US" sz="3600" dirty="0">
+                <a:latin typeface="+mn-lt"/>
+                <a:cs typeface="Arial" panose="020B0604020202020204" pitchFamily="34" charset="0"/>
+              </a:rPr>
+              <a:t>As such, we will look to emply ML techniques to forecast trading probabilities for 2 credit instruments.</a:t>
+            </a:r>
           </a:p>
           <a:p>
             <a:pPr marL="0" indent="0" eaLnBrk="1" hangingPunct="1">
@@ -4704,8 +4823,8 @@
         </p:nvSpPr>
         <p:spPr bwMode="auto">
           <a:xfrm>
-            <a:off x="1219200" y="29337000"/>
-            <a:ext cx="14325600" cy="12954000"/>
+            <a:off x="1219200" y="28643262"/>
+            <a:ext cx="14292510" cy="13419138"/>
           </a:xfrm>
           <a:prstGeom prst="rect">
             <a:avLst/>
@@ -4853,22 +4972,44 @@
             </a:r>
           </a:p>
           <a:p>
-            <a:pPr marL="677863" indent="-677863" eaLnBrk="1" hangingPunct="1">
-              <a:buFont typeface="Arial" panose="020B0604020202020204" pitchFamily="34" charset="0"/>
-              <a:buChar char="•"/>
+            <a:pPr marL="0" indent="0" eaLnBrk="1" hangingPunct="1">
+              <a:spcBef>
+                <a:spcPts val="600"/>
+              </a:spcBef>
+              <a:spcAft>
+                <a:spcPts val="600"/>
+              </a:spcAft>
             </a:pPr>
             <a:r>
               <a:rPr lang="en-US" altLang="en-US" sz="3600" dirty="0">
                 <a:latin typeface="+mn-lt"/>
                 <a:cs typeface="Arial" panose="020B0604020202020204" pitchFamily="34" charset="0"/>
               </a:rPr>
-              <a:t>We collect and separate our target variables from the rest of the data, and create train and test sets.</a:t>
-            </a:r>
-          </a:p>
-          <a:p>
-            <a:pPr marL="677863" indent="-677863" eaLnBrk="1" hangingPunct="1">
-              <a:buFont typeface="Arial" panose="020B0604020202020204" pitchFamily="34" charset="0"/>
-              <a:buChar char="•"/>
+              <a:t>We collect and separate our target variables from the rest of the data, and create train and test </a:t>
+            </a:r>
+            <a:r>
+              <a:rPr lang="en-US" altLang="en-US" sz="3600" dirty="0" err="1">
+                <a:latin typeface="+mn-lt"/>
+                <a:cs typeface="Arial" panose="020B0604020202020204" pitchFamily="34" charset="0"/>
+              </a:rPr>
+              <a:t>sets.We</a:t>
+            </a:r>
+            <a:r>
+              <a:rPr lang="en-US" altLang="en-US" sz="3600" dirty="0">
+                <a:latin typeface="+mn-lt"/>
+                <a:cs typeface="Arial" panose="020B0604020202020204" pitchFamily="34" charset="0"/>
+              </a:rPr>
+              <a:t> train on data from September of 2012 to August of 2018, and we test on data from August of 2018 to July of 2020.</a:t>
+            </a:r>
+          </a:p>
+          <a:p>
+            <a:pPr marL="0" indent="0" eaLnBrk="1" hangingPunct="1">
+              <a:spcBef>
+                <a:spcPts val="600"/>
+              </a:spcBef>
+              <a:spcAft>
+                <a:spcPts val="600"/>
+              </a:spcAft>
             </a:pPr>
             <a:r>
               <a:rPr lang="en-US" altLang="en-US" sz="3600" dirty="0">
@@ -4889,75 +5030,63 @@
                 <a:latin typeface="+mn-lt"/>
                 <a:cs typeface="Arial" panose="020B0604020202020204" pitchFamily="34" charset="0"/>
               </a:rPr>
-              <a:t> classifier to fit to the training data. Two feature importance graphs are made for the two target variables,</a:t>
-            </a:r>
-            <a:r>
-              <a:rPr lang="en-US" altLang="en-US" sz="3600" dirty="0">
-                <a:latin typeface="+mn-lt"/>
-                <a:ea typeface="ＭＳ Ｐゴシック"/>
-                <a:cs typeface="Arial"/>
-              </a:rPr>
-              <a:t> investment grade (CDX.IG) or high yield (CDX.HY). The two feature importance graphs are then added together and the top 20 features are kept for the next model. The filter to only keeping the top 20 features are used for the purpose to speed up predictions.</a:t>
-            </a:r>
-          </a:p>
-          <a:p>
-            <a:pPr marL="677863" indent="-677863" eaLnBrk="1" hangingPunct="1">
-              <a:buFont typeface="Arial" panose="020B0604020202020204" pitchFamily="34" charset="0"/>
-              <a:buChar char="•"/>
-            </a:pPr>
-            <a:r>
-              <a:rPr lang="en-US" altLang="en-US" sz="3600" dirty="0">
-                <a:latin typeface="+mn-lt"/>
-                <a:ea typeface="ＭＳ Ｐゴシック"/>
-                <a:cs typeface="Arial"/>
-              </a:rPr>
-              <a:t>Random Forest with parameters of </a:t>
-            </a:r>
-            <a:r>
-              <a:rPr lang="en-US" altLang="en-US" sz="3600" dirty="0" err="1">
-                <a:latin typeface="+mn-lt"/>
-                <a:ea typeface="ＭＳ Ｐゴシック"/>
-                <a:cs typeface="Arial"/>
-              </a:rPr>
-              <a:t>n_estimators</a:t>
-            </a:r>
-            <a:r>
-              <a:rPr lang="en-US" altLang="en-US" sz="3600" dirty="0">
-                <a:latin typeface="+mn-lt"/>
-                <a:ea typeface="ＭＳ Ｐゴシック"/>
-                <a:cs typeface="Arial"/>
-              </a:rPr>
-              <a:t> equal to 100 and a criterion equal to ‘</a:t>
-            </a:r>
-            <a:r>
-              <a:rPr lang="en-US" altLang="en-US" sz="3600" dirty="0" err="1">
-                <a:latin typeface="+mn-lt"/>
-                <a:ea typeface="ＭＳ Ｐゴシック"/>
-                <a:cs typeface="Arial"/>
-              </a:rPr>
-              <a:t>gini</a:t>
-            </a:r>
-            <a:r>
-              <a:rPr lang="en-US" altLang="en-US" sz="3600" dirty="0">
-                <a:latin typeface="+mn-lt"/>
-                <a:ea typeface="ＭＳ Ｐゴシック"/>
-                <a:cs typeface="Arial"/>
-              </a:rPr>
-              <a:t>’ were used as models for predicting the CDX.IG and the CDX.HY. Random Forest was used since it less likely to be influenced by outliers, and can also handle non-linear relationships.</a:t>
-            </a:r>
-          </a:p>
-          <a:p>
-            <a:pPr marL="677863" indent="-677863" eaLnBrk="1" hangingPunct="1">
-              <a:buFont typeface="Arial" panose="020B0604020202020204" pitchFamily="34" charset="0"/>
-              <a:buChar char="•"/>
+              <a:t> classifier to fit to the training data. Two feature importance graphs are made for the two target variables, investment grade (CDX.IG) or high yield (CDX.HY). The two feature importance graphs are then added together, and the top 20 features are kept for the next model. The filter to only keeping the top 20 features are used for the purpose to speed up predictions.</a:t>
+            </a:r>
+          </a:p>
+          <a:p>
+            <a:pPr marL="0" indent="0" eaLnBrk="1" hangingPunct="1">
+              <a:spcBef>
+                <a:spcPts val="600"/>
+              </a:spcBef>
+              <a:spcAft>
+                <a:spcPts val="600"/>
+              </a:spcAft>
             </a:pPr>
             <a:r>
               <a:rPr lang="en-US" altLang="en-US" sz="3600" dirty="0">
                 <a:latin typeface="+mn-lt"/>
                 <a:cs typeface="Arial" panose="020B0604020202020204" pitchFamily="34" charset="0"/>
               </a:rPr>
-              <a:t>Other models test were </a:t>
-            </a:r>
+              <a:t>Random Forest with parameters of </a:t>
+            </a:r>
+            <a:r>
+              <a:rPr lang="en-US" altLang="en-US" sz="3600" dirty="0" err="1">
+                <a:latin typeface="+mn-lt"/>
+                <a:cs typeface="Arial" panose="020B0604020202020204" pitchFamily="34" charset="0"/>
+              </a:rPr>
+              <a:t>n_estimators</a:t>
+            </a:r>
+            <a:r>
+              <a:rPr lang="en-US" altLang="en-US" sz="3600" dirty="0">
+                <a:latin typeface="+mn-lt"/>
+                <a:cs typeface="Arial" panose="020B0604020202020204" pitchFamily="34" charset="0"/>
+              </a:rPr>
+              <a:t> equal to 100 and a criterion equal to ‘</a:t>
+            </a:r>
+            <a:r>
+              <a:rPr lang="en-US" altLang="en-US" sz="3600" dirty="0" err="1">
+                <a:latin typeface="+mn-lt"/>
+                <a:cs typeface="Arial" panose="020B0604020202020204" pitchFamily="34" charset="0"/>
+              </a:rPr>
+              <a:t>gini</a:t>
+            </a:r>
+            <a:r>
+              <a:rPr lang="en-US" altLang="en-US" sz="3600" dirty="0">
+                <a:latin typeface="+mn-lt"/>
+                <a:cs typeface="Arial" panose="020B0604020202020204" pitchFamily="34" charset="0"/>
+              </a:rPr>
+              <a:t>’ was tested, since the Random Forest algorithm is less likely to be influenced by outliers, and can also handle non-linear relationships.</a:t>
+            </a:r>
+          </a:p>
+          <a:p>
+            <a:pPr marL="0" indent="0" eaLnBrk="1" hangingPunct="1">
+              <a:spcBef>
+                <a:spcPts val="600"/>
+              </a:spcBef>
+              <a:spcAft>
+                <a:spcPts val="600"/>
+              </a:spcAft>
+            </a:pPr>
             <a:r>
               <a:rPr lang="en-US" altLang="en-US" sz="3600" dirty="0" err="1">
                 <a:latin typeface="+mn-lt"/>
@@ -4970,7 +5099,7 @@
                 <a:latin typeface="+mn-lt"/>
                 <a:cs typeface="Arial" panose="020B0604020202020204" pitchFamily="34" charset="0"/>
               </a:rPr>
-              <a:t>, with parameters using </a:t>
+              <a:t> was picked as the final ML algorithm to reduce both bias and variance in the data, where Random Forest only reduced variance. We used the parameters of </a:t>
             </a:r>
             <a:r>
               <a:rPr lang="en-US" altLang="en-US" sz="3600" dirty="0" err="1">
@@ -4984,31 +5113,25 @@
                 <a:latin typeface="+mn-lt"/>
                 <a:cs typeface="Arial" panose="020B0604020202020204" pitchFamily="34" charset="0"/>
               </a:rPr>
-              <a:t> equal to 50 and learning rate equal to 1.</a:t>
-            </a:r>
-          </a:p>
-          <a:p>
-            <a:pPr marL="677863" indent="-677863" eaLnBrk="1" hangingPunct="1">
-              <a:buFont typeface="Arial" panose="020B0604020202020204" pitchFamily="34" charset="0"/>
-              <a:buChar char="•"/>
+              <a:t> equal to 30 and learning rate equal to 0.5, parameters which were acquired using cross validation. </a:t>
+            </a:r>
+          </a:p>
+          <a:p>
+            <a:pPr marL="0" indent="0" eaLnBrk="1" hangingPunct="1">
+              <a:spcBef>
+                <a:spcPts val="600"/>
+              </a:spcBef>
+              <a:spcAft>
+                <a:spcPts val="600"/>
+              </a:spcAft>
             </a:pPr>
             <a:r>
               <a:rPr lang="en-US" altLang="en-US" sz="3600" dirty="0">
                 <a:latin typeface="+mn-lt"/>
                 <a:cs typeface="Arial" panose="020B0604020202020204" pitchFamily="34" charset="0"/>
               </a:rPr>
-              <a:t>The prediction created by these models are binary outputs predicting if we predict and increase in price or a decrease. A simpler binary prediction was chosen over regression to try to increase prediction accuracy</a:t>
-            </a:r>
-          </a:p>
-          <a:p>
-            <a:pPr eaLnBrk="1" hangingPunct="1">
-              <a:buFont typeface="Arial" panose="020B0604020202020204" pitchFamily="34" charset="0"/>
-              <a:buNone/>
-            </a:pPr>
-            <a:endParaRPr lang="en-US" altLang="en-US" sz="3600" dirty="0">
-              <a:latin typeface="+mn-lt"/>
-              <a:cs typeface="Arial" panose="020B0604020202020204" pitchFamily="34" charset="0"/>
-            </a:endParaRPr>
+              <a:t>The prediction created by these models are binary outputs predicting increase in price or a decrease. A simpler binary prediction was chosen over regression to try to increase prediction accuracy.</a:t>
+            </a:r>
           </a:p>
         </p:txBody>
       </p:sp>
@@ -5022,8 +5145,8 @@
         </p:nvSpPr>
         <p:spPr bwMode="auto">
           <a:xfrm>
-            <a:off x="16138525" y="21564600"/>
-            <a:ext cx="13731875" cy="20650198"/>
+            <a:off x="15952789" y="19872325"/>
+            <a:ext cx="13917611" cy="22342473"/>
           </a:xfrm>
           <a:prstGeom prst="rect">
             <a:avLst/>
@@ -5173,23 +5296,67 @@
           <a:p>
             <a:pPr marL="0" indent="0" eaLnBrk="1" hangingPunct="1">
               <a:spcBef>
-                <a:spcPct val="20000"/>
+                <a:spcPts val="600"/>
               </a:spcBef>
-              <a:tabLst>
-                <a:tab pos="855663" algn="l"/>
-              </a:tabLst>
+              <a:spcAft>
+                <a:spcPts val="600"/>
+              </a:spcAft>
             </a:pPr>
             <a:r>
               <a:rPr lang="en-US" altLang="en-US" sz="3600" dirty="0">
                 <a:latin typeface="+mn-lt"/>
                 <a:cs typeface="Arial" panose="020B0604020202020204" pitchFamily="34" charset="0"/>
               </a:rPr>
-              <a:t>	Our predictions are decently accurate on a binary scale that means we don’t have the most efficient predictions. The model is just predicting if it expects an increase or decrease in value, that could mean that we can long for 30 days but have a peak on day 10. Thus, the model will lose information especially on peaks. Binary outputs however, increases the model accuracy even though information is lost. The predictions made can be used to suggest safe investments, but not the most efficient.</a:t>
-            </a:r>
-            <a:endParaRPr lang="en-US" altLang="en-US" sz="5400" b="1" dirty="0">
-              <a:latin typeface="+mn-lt"/>
-              <a:cs typeface="Arial" panose="020B0604020202020204" pitchFamily="34" charset="0"/>
-            </a:endParaRPr>
+              <a:t>We find that our predictions are decently accurate, which means there is potential of applying this algorithm to trade CDX.  </a:t>
+            </a:r>
+          </a:p>
+          <a:p>
+            <a:pPr marL="0" indent="0" eaLnBrk="1" hangingPunct="1">
+              <a:spcBef>
+                <a:spcPts val="600"/>
+              </a:spcBef>
+              <a:spcAft>
+                <a:spcPts val="600"/>
+              </a:spcAft>
+            </a:pPr>
+            <a:r>
+              <a:rPr lang="en-US" altLang="en-US" sz="3600" dirty="0">
+                <a:latin typeface="+mn-lt"/>
+                <a:cs typeface="Arial" panose="020B0604020202020204" pitchFamily="34" charset="0"/>
+              </a:rPr>
+              <a:t>We thought we got </a:t>
+            </a:r>
+            <a:r>
+              <a:rPr lang="en-US" altLang="en-US" sz="3600">
+                <a:latin typeface="+mn-lt"/>
+                <a:cs typeface="Arial" panose="020B0604020202020204" pitchFamily="34" charset="0"/>
+              </a:rPr>
+              <a:t>quite a good </a:t>
+            </a:r>
+            <a:r>
+              <a:rPr lang="en-US" altLang="en-US" sz="3600" dirty="0">
+                <a:latin typeface="+mn-lt"/>
+                <a:cs typeface="Arial" panose="020B0604020202020204" pitchFamily="34" charset="0"/>
+              </a:rPr>
+              <a:t>accuracy because the CDX market is quite niche with lower volume traded, that retail investors tend to shy away from, and this offers a unique opportunity to develop ML models in a less competitive environment, hence a greater return. </a:t>
+            </a:r>
+          </a:p>
+          <a:p>
+            <a:pPr marL="0" indent="0" eaLnBrk="1" hangingPunct="1">
+              <a:spcBef>
+                <a:spcPts val="600"/>
+              </a:spcBef>
+              <a:spcAft>
+                <a:spcPts val="600"/>
+              </a:spcAft>
+            </a:pPr>
+            <a:r>
+              <a:rPr lang="en-US" altLang="en-US" sz="3600" dirty="0">
+                <a:latin typeface="+mn-lt"/>
+                <a:cs typeface="Arial" panose="020B0604020202020204" pitchFamily="34" charset="0"/>
+              </a:rPr>
+              <a:t>For now, the model we built is just predicting if it expects an increase or decrease in value, which suggest a long or short position, providing greater confidence and safer investment. As an extension in future, we could enhance the model to predict a real value, i.e. “regression” instead of “classification”, this will further increase the value and potential of this system in supporting CDX trading decisions.</a:t>
+            </a:r>
           </a:p>
           <a:p>
             <a:pPr marL="0" indent="0" eaLnBrk="1" hangingPunct="1">
@@ -5206,105 +5373,6 @@
             </a:r>
             <a:endParaRPr lang="en-US" altLang="en-US" sz="13100" b="1" dirty="0">
               <a:latin typeface="+mn-lt"/>
-            </a:endParaRPr>
-          </a:p>
-          <a:p>
-            <a:pPr marL="0" indent="0" eaLnBrk="1" hangingPunct="1">
-              <a:spcBef>
-                <a:spcPct val="20000"/>
-              </a:spcBef>
-            </a:pPr>
-            <a:endParaRPr lang="en-US" altLang="en-US" sz="3600" dirty="0">
-              <a:latin typeface="+mn-lt"/>
-              <a:cs typeface="Arial" panose="020B0604020202020204" pitchFamily="34" charset="0"/>
-            </a:endParaRPr>
-          </a:p>
-          <a:p>
-            <a:pPr marL="0" indent="0" eaLnBrk="1" hangingPunct="1">
-              <a:spcBef>
-                <a:spcPct val="20000"/>
-              </a:spcBef>
-            </a:pPr>
-            <a:endParaRPr lang="en-US" altLang="en-US" sz="3600" dirty="0">
-              <a:latin typeface="+mn-lt"/>
-              <a:cs typeface="Arial" panose="020B0604020202020204" pitchFamily="34" charset="0"/>
-            </a:endParaRPr>
-          </a:p>
-          <a:p>
-            <a:pPr marL="0" indent="0" eaLnBrk="1" hangingPunct="1">
-              <a:spcBef>
-                <a:spcPct val="20000"/>
-              </a:spcBef>
-            </a:pPr>
-            <a:endParaRPr lang="en-US" altLang="en-US" sz="3600" dirty="0">
-              <a:latin typeface="+mn-lt"/>
-              <a:cs typeface="Arial" panose="020B0604020202020204" pitchFamily="34" charset="0"/>
-            </a:endParaRPr>
-          </a:p>
-          <a:p>
-            <a:pPr marL="0" indent="0" eaLnBrk="1" hangingPunct="1">
-              <a:spcBef>
-                <a:spcPct val="20000"/>
-              </a:spcBef>
-            </a:pPr>
-            <a:endParaRPr lang="en-US" altLang="en-US" sz="3600" dirty="0">
-              <a:latin typeface="+mn-lt"/>
-              <a:cs typeface="Arial" panose="020B0604020202020204" pitchFamily="34" charset="0"/>
-            </a:endParaRPr>
-          </a:p>
-          <a:p>
-            <a:pPr marL="0" indent="0" eaLnBrk="1" hangingPunct="1">
-              <a:spcBef>
-                <a:spcPct val="20000"/>
-              </a:spcBef>
-            </a:pPr>
-            <a:endParaRPr lang="en-US" altLang="en-US" sz="3600" dirty="0">
-              <a:latin typeface="+mn-lt"/>
-              <a:cs typeface="Arial" panose="020B0604020202020204" pitchFamily="34" charset="0"/>
-            </a:endParaRPr>
-          </a:p>
-          <a:p>
-            <a:pPr marL="0" indent="0" eaLnBrk="1" hangingPunct="1">
-              <a:spcBef>
-                <a:spcPct val="20000"/>
-              </a:spcBef>
-            </a:pPr>
-            <a:endParaRPr lang="en-US" altLang="en-US" sz="3600" dirty="0">
-              <a:latin typeface="+mn-lt"/>
-              <a:cs typeface="Arial" panose="020B0604020202020204" pitchFamily="34" charset="0"/>
-            </a:endParaRPr>
-          </a:p>
-          <a:p>
-            <a:pPr marL="0" indent="0" eaLnBrk="1" hangingPunct="1">
-              <a:spcBef>
-                <a:spcPct val="20000"/>
-              </a:spcBef>
-            </a:pPr>
-            <a:endParaRPr lang="en-US" altLang="en-US" sz="3600" dirty="0">
-              <a:latin typeface="+mn-lt"/>
-              <a:cs typeface="Arial" panose="020B0604020202020204" pitchFamily="34" charset="0"/>
-            </a:endParaRPr>
-          </a:p>
-          <a:p>
-            <a:pPr marL="0" indent="0" eaLnBrk="1" hangingPunct="1">
-              <a:spcBef>
-                <a:spcPct val="20000"/>
-              </a:spcBef>
-            </a:pPr>
-            <a:endParaRPr lang="en-US" altLang="en-US" sz="3600" dirty="0">
-              <a:latin typeface="+mn-lt"/>
-              <a:cs typeface="Arial" panose="020B0604020202020204" pitchFamily="34" charset="0"/>
-            </a:endParaRPr>
-          </a:p>
-          <a:p>
-            <a:pPr marL="0" indent="0" eaLnBrk="1" hangingPunct="1">
-              <a:spcBef>
-                <a:spcPct val="20000"/>
-              </a:spcBef>
-            </a:pPr>
-            <a:endParaRPr lang="en-US" altLang="en-US" sz="3600" dirty="0">
-              <a:latin typeface="+mn-lt"/>
-              <a:cs typeface="Arial" panose="020B0604020202020204" pitchFamily="34" charset="0"/>
             </a:endParaRPr>
           </a:p>
           <a:p>
@@ -5324,6 +5392,94 @@
                 <a:spcPct val="20000"/>
               </a:spcBef>
             </a:pPr>
+            <a:endParaRPr lang="en-US" altLang="en-US" sz="3600" dirty="0">
+              <a:latin typeface="+mn-lt"/>
+              <a:cs typeface="Arial" panose="020B0604020202020204" pitchFamily="34" charset="0"/>
+            </a:endParaRPr>
+          </a:p>
+          <a:p>
+            <a:pPr marL="0" indent="0" algn="ctr" eaLnBrk="1" hangingPunct="1">
+              <a:spcBef>
+                <a:spcPct val="20000"/>
+              </a:spcBef>
+            </a:pPr>
+            <a:endParaRPr lang="en-US" altLang="en-US" sz="3600" dirty="0">
+              <a:latin typeface="+mn-lt"/>
+              <a:cs typeface="Arial" panose="020B0604020202020204" pitchFamily="34" charset="0"/>
+            </a:endParaRPr>
+          </a:p>
+          <a:p>
+            <a:pPr marL="0" indent="0" algn="ctr" eaLnBrk="1" hangingPunct="1">
+              <a:spcBef>
+                <a:spcPct val="20000"/>
+              </a:spcBef>
+            </a:pPr>
+            <a:endParaRPr lang="en-US" altLang="en-US" sz="3600" dirty="0">
+              <a:latin typeface="+mn-lt"/>
+              <a:cs typeface="Arial" panose="020B0604020202020204" pitchFamily="34" charset="0"/>
+            </a:endParaRPr>
+          </a:p>
+          <a:p>
+            <a:pPr marL="0" indent="0" algn="ctr" eaLnBrk="1" hangingPunct="1">
+              <a:spcBef>
+                <a:spcPct val="20000"/>
+              </a:spcBef>
+            </a:pPr>
+            <a:endParaRPr lang="en-US" altLang="en-US" sz="3600" dirty="0">
+              <a:latin typeface="+mn-lt"/>
+              <a:cs typeface="Arial" panose="020B0604020202020204" pitchFamily="34" charset="0"/>
+            </a:endParaRPr>
+          </a:p>
+          <a:p>
+            <a:pPr marL="0" indent="0" algn="ctr" eaLnBrk="1" hangingPunct="1">
+              <a:spcBef>
+                <a:spcPct val="20000"/>
+              </a:spcBef>
+            </a:pPr>
+            <a:endParaRPr lang="en-US" altLang="en-US" sz="3600" dirty="0">
+              <a:latin typeface="+mn-lt"/>
+              <a:cs typeface="Arial" panose="020B0604020202020204" pitchFamily="34" charset="0"/>
+            </a:endParaRPr>
+          </a:p>
+          <a:p>
+            <a:pPr marL="0" indent="0" algn="ctr" eaLnBrk="1" hangingPunct="1">
+              <a:spcBef>
+                <a:spcPct val="20000"/>
+              </a:spcBef>
+            </a:pPr>
+            <a:endParaRPr lang="en-US" altLang="en-US" sz="3600" dirty="0">
+              <a:latin typeface="+mn-lt"/>
+              <a:cs typeface="Arial" panose="020B0604020202020204" pitchFamily="34" charset="0"/>
+            </a:endParaRPr>
+          </a:p>
+          <a:p>
+            <a:pPr marL="0" indent="0" algn="ctr" eaLnBrk="1" hangingPunct="1">
+              <a:spcBef>
+                <a:spcPct val="20000"/>
+              </a:spcBef>
+            </a:pPr>
+            <a:endParaRPr lang="en-US" altLang="en-US" sz="3600" dirty="0">
+              <a:latin typeface="+mn-lt"/>
+              <a:cs typeface="Arial" panose="020B0604020202020204" pitchFamily="34" charset="0"/>
+            </a:endParaRPr>
+          </a:p>
+          <a:p>
+            <a:pPr marL="0" indent="0" algn="ctr" eaLnBrk="1" hangingPunct="1">
+              <a:spcBef>
+                <a:spcPct val="20000"/>
+              </a:spcBef>
+            </a:pPr>
+            <a:endParaRPr lang="en-US" altLang="en-US" sz="3600" dirty="0">
+              <a:latin typeface="+mn-lt"/>
+              <a:cs typeface="Arial" panose="020B0604020202020204" pitchFamily="34" charset="0"/>
+            </a:endParaRPr>
+          </a:p>
+          <a:p>
+            <a:pPr marL="0" indent="0" algn="ctr" eaLnBrk="1" hangingPunct="1">
+              <a:spcBef>
+                <a:spcPct val="20000"/>
+              </a:spcBef>
+            </a:pPr>
             <a:r>
               <a:rPr lang="en-US" altLang="en-US" sz="3600" dirty="0">
                 <a:latin typeface="+mn-lt"/>
@@ -5335,52 +5491,52 @@
           <a:p>
             <a:pPr marL="0" indent="0" eaLnBrk="1" hangingPunct="1">
               <a:spcBef>
-                <a:spcPct val="20000"/>
+                <a:spcPts val="600"/>
               </a:spcBef>
-              <a:tabLst>
-                <a:tab pos="855663" algn="l"/>
-              </a:tabLst>
+              <a:spcAft>
+                <a:spcPts val="600"/>
+              </a:spcAft>
             </a:pPr>
             <a:r>
               <a:rPr lang="en-US" altLang="en-US" sz="3600" dirty="0">
                 <a:latin typeface="+mn-lt"/>
                 <a:cs typeface="Arial" panose="020B0604020202020204" pitchFamily="34" charset="0"/>
               </a:rPr>
-              <a:t>	The prediction ML model which is developed, will be deployed into a decision support system which allows the Trading Analyst to receive trade recommendations, and look at the predictive results to assist in his decision making. </a:t>
+              <a:t>The prediction ML model which is developed, will be deployed into a decision support system which allows the Trading Analyst to receive trade recommendations, and look at the predictive results to assist in his decision making. </a:t>
             </a:r>
           </a:p>
           <a:p>
             <a:pPr marL="0" indent="0" eaLnBrk="1" hangingPunct="1">
               <a:spcBef>
-                <a:spcPct val="20000"/>
+                <a:spcPts val="600"/>
               </a:spcBef>
-              <a:tabLst>
-                <a:tab pos="855663" algn="l"/>
-              </a:tabLst>
+              <a:spcAft>
+                <a:spcPts val="600"/>
+              </a:spcAft>
             </a:pPr>
             <a:r>
               <a:rPr lang="en-US" altLang="en-US" sz="3600" dirty="0">
                 <a:latin typeface="+mn-lt"/>
                 <a:cs typeface="Arial" panose="020B0604020202020204" pitchFamily="34" charset="0"/>
               </a:rPr>
-              <a:t>	To simulate how the system will function, we have developed a web application prototype (as seen in the image above), loading in data extracted from Bloomberg system.</a:t>
+              <a:t>To simulate how the system will function, we have developed a web application prototype (as seen in the image above), loading in data extracted from Bloomberg system.</a:t>
             </a:r>
           </a:p>
           <a:p>
             <a:pPr marL="0" indent="0" eaLnBrk="1" hangingPunct="1">
               <a:spcBef>
-                <a:spcPct val="20000"/>
+                <a:spcPts val="600"/>
               </a:spcBef>
-              <a:tabLst>
-                <a:tab pos="973138" algn="l"/>
-              </a:tabLst>
+              <a:spcAft>
+                <a:spcPts val="600"/>
+              </a:spcAft>
             </a:pPr>
             <a:r>
               <a:rPr lang="en-US" altLang="en-US" sz="3600" dirty="0">
                 <a:latin typeface="+mn-lt"/>
                 <a:cs typeface="Arial" panose="020B0604020202020204" pitchFamily="34" charset="0"/>
               </a:rPr>
-              <a:t>	For the actual production environment, we can deploy the system as a cloud application running on AWS with API function call to Bloomberg API for daily data loading. This will allow for continuous update to the model, making it a ‘live’ system.</a:t>
+              <a:t>For the actual production environment, we can deploy the system as a cloud application running on AWS with API function call to Bloomberg API for daily data loading. This will allow for continuous update to the model, making it a ‘live’ system.</a:t>
             </a:r>
           </a:p>
         </p:txBody>
@@ -5395,8 +5551,8 @@
         </p:nvSpPr>
         <p:spPr bwMode="auto">
           <a:xfrm>
-            <a:off x="1219200" y="13909146"/>
-            <a:ext cx="14325600" cy="7650162"/>
+            <a:off x="1219200" y="14935200"/>
+            <a:ext cx="14231938" cy="7195684"/>
           </a:xfrm>
           <a:prstGeom prst="rect">
             <a:avLst/>
@@ -5544,53 +5700,96 @@
             </a:r>
           </a:p>
           <a:p>
-            <a:pPr marL="571500" indent="-571500" eaLnBrk="1" hangingPunct="1">
-              <a:buFont typeface="Arial" panose="020B0604020202020204" pitchFamily="34" charset="0"/>
-              <a:buChar char="•"/>
+            <a:pPr marL="0" indent="0" eaLnBrk="1" hangingPunct="1">
+              <a:spcBef>
+                <a:spcPts val="600"/>
+              </a:spcBef>
+              <a:spcAft>
+                <a:spcPts val="600"/>
+              </a:spcAft>
             </a:pPr>
             <a:r>
               <a:rPr lang="en-US" altLang="en-US" sz="3600" dirty="0">
                 <a:latin typeface="+mn-lt"/>
-                <a:ea typeface="ＭＳ Ｐゴシック"/>
-                <a:cs typeface="Arial"/>
+                <a:cs typeface="Arial" panose="020B0604020202020204" pitchFamily="34" charset="0"/>
               </a:rPr>
-              <a:t>Our target securities are two different inidices which comprise a basket of Credit Default Swaps, the CDX.IG and the CDX.HY. Each securitiy is defined by an underlying correlation to the most liquid CDS traded for companies with credit ratings which are investment grade (CDX.IG) or high yield (CDX.HY)</a:t>
-            </a:r>
-            <a:endParaRPr lang="en-US" altLang="en-US" sz="3600" dirty="0">
-              <a:latin typeface="+mn-lt"/>
-              <a:cs typeface="Arial" panose="020B0604020202020204" pitchFamily="34" charset="0"/>
-            </a:endParaRPr>
-          </a:p>
-          <a:p>
-            <a:pPr marL="571500" indent="-571500">
-              <a:buFont typeface="Arial" panose="020B0604020202020204" pitchFamily="34" charset="0"/>
-              <a:buChar char="•"/>
-            </a:pPr>
+              <a:t>Our target securities are two different inidices which comprise a basket of Credit Default Swaps, the CDX.IG and the CDX.HY. Each </a:t>
+            </a:r>
+            <a:r>
+              <a:rPr lang="en-US" altLang="en-US" sz="3600" dirty="0" err="1">
+                <a:latin typeface="+mn-lt"/>
+                <a:cs typeface="Arial" panose="020B0604020202020204" pitchFamily="34" charset="0"/>
+              </a:rPr>
+              <a:t>securitiy</a:t>
+            </a:r>
             <a:r>
               <a:rPr lang="en-US" altLang="en-US" sz="3600" dirty="0">
                 <a:latin typeface="+mn-lt"/>
-                <a:ea typeface="ＭＳ Ｐゴシック"/>
-                <a:cs typeface="Arial"/>
+                <a:cs typeface="Arial" panose="020B0604020202020204" pitchFamily="34" charset="0"/>
               </a:rPr>
-              <a:t>We will incoporate a number of fundmental, technical, relative value and socio- and macroeconomic features to help our forecast, including the underlying rate enviroment, comparable credit indicies, analyst forecasts, and commodity prices.</a:t>
-            </a:r>
-            <a:endParaRPr lang="en-US" altLang="en-US" sz="3600" dirty="0">
-              <a:latin typeface="+mn-lt"/>
-              <a:cs typeface="Arial" panose="020B0604020202020204" pitchFamily="34" charset="0"/>
-            </a:endParaRPr>
-          </a:p>
-          <a:p>
-            <a:pPr marL="0" indent="560388">
-              <a:buFont typeface="Arial" panose="020B0604020202020204" pitchFamily="34" charset="0"/>
-              <a:buChar char="•"/>
+              <a:t> is defined by an underlying correlation to the most liquid CDS traded for companies with credit ratings which are investment grade (CDX.IG) or high yield (CDX.HY)</a:t>
+            </a:r>
+          </a:p>
+          <a:p>
+            <a:pPr marL="0" indent="0" eaLnBrk="1" hangingPunct="1">
+              <a:spcBef>
+                <a:spcPts val="600"/>
+              </a:spcBef>
+              <a:spcAft>
+                <a:spcPts val="600"/>
+              </a:spcAft>
             </a:pPr>
             <a:r>
               <a:rPr lang="en-US" altLang="en-US" sz="3600" dirty="0">
                 <a:latin typeface="+mn-lt"/>
-                <a:ea typeface="ＭＳ Ｐゴシック"/>
-                <a:cs typeface="Arial"/>
+                <a:cs typeface="Arial" panose="020B0604020202020204" pitchFamily="34" charset="0"/>
               </a:rPr>
-              <a:t>We will use real trading data supplied by Bloomberg for analysis</a:t>
+              <a:t>We will incorporate a number of fundamental, technical, relative value and socio- and macroeconomic features to help our forecast, including the underlying rate </a:t>
+            </a:r>
+            <a:r>
+              <a:rPr lang="en-US" altLang="en-US" sz="3600" dirty="0" err="1">
+                <a:latin typeface="+mn-lt"/>
+                <a:cs typeface="Arial" panose="020B0604020202020204" pitchFamily="34" charset="0"/>
+              </a:rPr>
+              <a:t>enviroment</a:t>
+            </a:r>
+            <a:r>
+              <a:rPr lang="en-US" altLang="en-US" sz="3600" dirty="0">
+                <a:latin typeface="+mn-lt"/>
+                <a:cs typeface="Arial" panose="020B0604020202020204" pitchFamily="34" charset="0"/>
+              </a:rPr>
+              <a:t>, comparable credit </a:t>
+            </a:r>
+            <a:r>
+              <a:rPr lang="en-US" altLang="en-US" sz="3600" dirty="0" err="1">
+                <a:latin typeface="+mn-lt"/>
+                <a:cs typeface="Arial" panose="020B0604020202020204" pitchFamily="34" charset="0"/>
+              </a:rPr>
+              <a:t>indicies</a:t>
+            </a:r>
+            <a:r>
+              <a:rPr lang="en-US" altLang="en-US" sz="3600" dirty="0">
+                <a:latin typeface="+mn-lt"/>
+                <a:cs typeface="Arial" panose="020B0604020202020204" pitchFamily="34" charset="0"/>
+              </a:rPr>
+              <a:t>, analyst forecasts, and commodity prices.</a:t>
+            </a:r>
+          </a:p>
+          <a:p>
+            <a:pPr marL="0" indent="0" eaLnBrk="1" hangingPunct="1">
+              <a:spcBef>
+                <a:spcPts val="600"/>
+              </a:spcBef>
+              <a:spcAft>
+                <a:spcPts val="600"/>
+              </a:spcAft>
+            </a:pPr>
+            <a:r>
+              <a:rPr lang="en-US" altLang="en-US" sz="3600" dirty="0">
+                <a:latin typeface="+mn-lt"/>
+                <a:cs typeface="Arial" panose="020B0604020202020204" pitchFamily="34" charset="0"/>
+              </a:rPr>
+              <a:t>We used real trading data supplied by Bloomberg Terminal for analysis</a:t>
             </a:r>
           </a:p>
         </p:txBody>
@@ -5605,8 +5804,8 @@
         </p:nvSpPr>
         <p:spPr bwMode="auto">
           <a:xfrm>
-            <a:off x="1219200" y="21828654"/>
-            <a:ext cx="14325600" cy="7239000"/>
+            <a:off x="1219200" y="22410738"/>
+            <a:ext cx="14231938" cy="6011862"/>
           </a:xfrm>
           <a:prstGeom prst="rect">
             <a:avLst/>
@@ -5754,9 +5953,13 @@
             </a:r>
           </a:p>
           <a:p>
-            <a:pPr marL="619125" indent="-619125" eaLnBrk="1" hangingPunct="1">
-              <a:buFont typeface="Arial" panose="020B0604020202020204" pitchFamily="34" charset="0"/>
-              <a:buChar char="•"/>
+            <a:pPr marL="0" indent="0" eaLnBrk="1" hangingPunct="1">
+              <a:spcBef>
+                <a:spcPts val="600"/>
+              </a:spcBef>
+              <a:spcAft>
+                <a:spcPts val="600"/>
+              </a:spcAft>
             </a:pPr>
             <a:r>
               <a:rPr lang="en-US" altLang="en-US" sz="3600" dirty="0">
@@ -5767,9 +5970,13 @@
             </a:r>
           </a:p>
           <a:p>
-            <a:pPr marL="619125" indent="-619125" eaLnBrk="1" hangingPunct="1">
-              <a:buFont typeface="Arial" panose="020B0604020202020204" pitchFamily="34" charset="0"/>
-              <a:buChar char="•"/>
+            <a:pPr marL="0" indent="0" eaLnBrk="1" hangingPunct="1">
+              <a:spcBef>
+                <a:spcPts val="600"/>
+              </a:spcBef>
+              <a:spcAft>
+                <a:spcPts val="600"/>
+              </a:spcAft>
             </a:pPr>
             <a:r>
               <a:rPr lang="en-US" altLang="en-US" sz="3600" dirty="0">
@@ -5796,14 +6003,14 @@
           <p:nvPr/>
         </p:nvPicPr>
         <p:blipFill>
-          <a:blip r:embed="rId2"/>
+          <a:blip r:embed="rId3"/>
           <a:stretch>
             <a:fillRect/>
           </a:stretch>
         </p:blipFill>
         <p:spPr>
           <a:xfrm>
-            <a:off x="17737930" y="28793754"/>
+            <a:off x="17740312" y="29089576"/>
             <a:ext cx="10312400" cy="5648646"/>
           </a:xfrm>
           <a:prstGeom prst="rect">

</xml_diff>